<commit_message>
Poster stuff, some illustration, and data analysis with plots.
</commit_message>
<xml_diff>
--- a/publicate/SIAM_PNW2017.pptx
+++ b/publicate/SIAM_PNW2017.pptx
@@ -303,7 +303,7 @@
             <a:fld id="{6C66A11C-35CB-4357-BF51-B1A140CEEBB6}" type="datetime1">
               <a:rPr lang="en-US" altLang="en-US"/>
               <a:pPr/>
-              <a:t>10/20/2017</a:t>
+              <a:t>10/26/2017</a:t>
             </a:fld>
             <a:endParaRPr lang="en-US" altLang="en-US"/>
           </a:p>
@@ -493,7 +493,7 @@
             <a:fld id="{9DC7014A-DAD7-428C-AE8B-6551067651BA}" type="datetime1">
               <a:rPr lang="en-US" altLang="en-US"/>
               <a:pPr/>
-              <a:t>10/20/2017</a:t>
+              <a:t>10/26/2017</a:t>
             </a:fld>
             <a:endParaRPr lang="en-US" altLang="en-US"/>
           </a:p>
@@ -3481,7 +3481,6 @@
               <a:rPr lang="en-US" noProof="0" smtClean="0"/>
               <a:t>Click icon to add picture</a:t>
             </a:r>
-            <a:endParaRPr lang="en-US" noProof="0" smtClean="0"/>
           </a:p>
         </p:txBody>
       </p:sp>
@@ -3723,7 +3722,6 @@
               <a:rPr lang="en-US" altLang="en-US" smtClean="0"/>
               <a:t>Click to edit Master title style</a:t>
             </a:r>
-            <a:endParaRPr lang="en-US" altLang="en-US" smtClean="0"/>
           </a:p>
         </p:txBody>
       </p:sp>
@@ -3810,7 +3808,6 @@
               <a:rPr lang="en-US" altLang="en-US" smtClean="0"/>
               <a:t>Fifth level</a:t>
             </a:r>
-            <a:endParaRPr lang="en-US" altLang="en-US" smtClean="0"/>
           </a:p>
         </p:txBody>
       </p:sp>
@@ -4576,8 +4573,8 @@
         </p:nvSpPr>
         <p:spPr bwMode="auto">
           <a:xfrm>
-            <a:off x="1995488" y="7466013"/>
-            <a:ext cx="10512425" cy="8456612"/>
+            <a:off x="1995488" y="7466012"/>
+            <a:ext cx="10512425" cy="18096135"/>
           </a:xfrm>
           <a:prstGeom prst="rect">
             <a:avLst/>
@@ -4823,8 +4820,8 @@
         </p:nvSpPr>
         <p:spPr bwMode="auto">
           <a:xfrm>
-            <a:off x="1995488" y="16887825"/>
-            <a:ext cx="10512425" cy="8851900"/>
+            <a:off x="13432788" y="7439025"/>
+            <a:ext cx="10512425" cy="18294350"/>
           </a:xfrm>
           <a:prstGeom prst="rect">
             <a:avLst/>
@@ -5260,8 +5257,8 @@
         </p:nvSpPr>
         <p:spPr bwMode="auto">
           <a:xfrm>
-            <a:off x="13822363" y="7445375"/>
-            <a:ext cx="23347362" cy="18288000"/>
+            <a:off x="24627839" y="7445375"/>
+            <a:ext cx="12541885" cy="18288000"/>
           </a:xfrm>
           <a:prstGeom prst="rect">
             <a:avLst/>
@@ -5888,13 +5885,7 @@
               <a:rPr lang="en-US" altLang="en-US" sz="6000" b="1" dirty="0" smtClean="0">
                 <a:latin typeface="Gill Sans MT" panose="020B0502020104020203" pitchFamily="34" charset="0"/>
               </a:rPr>
-              <a:t>Daniel J Magee</a:t>
-            </a:r>
-            <a:r>
-              <a:rPr lang="en-US" altLang="en-US" sz="6000" b="1" dirty="0" smtClean="0">
-                <a:latin typeface="Gill Sans MT" panose="020B0502020104020203" pitchFamily="34" charset="0"/>
-              </a:rPr>
-              <a:t> </a:t>
+              <a:t>Daniel J Magee </a:t>
             </a:r>
             <a:r>
               <a:rPr lang="en-US" altLang="en-US" sz="6000" b="1" dirty="0">
@@ -6692,7 +6683,7 @@
               <a:buNone/>
             </a:pPr>
             <a:r>
-              <a:rPr lang="en-US" altLang="en-US" sz="4400" b="1">
+              <a:rPr lang="en-US" altLang="en-US" sz="4400" b="1" dirty="0">
                 <a:solidFill>
                   <a:srgbClr val="000000"/>
                 </a:solidFill>
@@ -6710,11 +6701,11 @@
               <a:buNone/>
             </a:pPr>
             <a:r>
-              <a:rPr lang="en-US" altLang="en-US" sz="2800" b="1"/>
+              <a:rPr lang="en-US" altLang="en-US" sz="2800" b="1" dirty="0"/>
               <a:t>© </a:t>
             </a:r>
             <a:r>
-              <a:rPr lang="en-US" altLang="en-US" sz="2800"/>
+              <a:rPr lang="en-US" altLang="en-US" sz="2800" dirty="0"/>
               <a:t>Copyright the authors.</a:t>
             </a:r>
           </a:p>
@@ -6726,7 +6717,7 @@
               <a:buFontTx/>
               <a:buNone/>
             </a:pPr>
-            <a:endParaRPr lang="en-US" altLang="en-US" sz="2800"/>
+            <a:endParaRPr lang="en-US" altLang="en-US" sz="2800" dirty="0"/>
           </a:p>
         </p:txBody>
       </p:sp>
@@ -6740,7 +6731,7 @@
         </p:nvSpPr>
         <p:spPr bwMode="auto">
           <a:xfrm>
-            <a:off x="896938" y="1352739"/>
+            <a:off x="877887" y="1970466"/>
             <a:ext cx="49450625" cy="1569660"/>
           </a:xfrm>
           <a:prstGeom prst="rect">
@@ -6766,14 +6757,10 @@
             </a:pPr>
             <a:r>
               <a:rPr lang="en-US" sz="9600" dirty="0"/>
-              <a:t>Swept rule domain decomposition </a:t>
-            </a:r>
-            <a:r>
-              <a:rPr lang="en-US" sz="9600"/>
-              <a:t>for </a:t>
-            </a:r>
-            <a:r>
-              <a:rPr lang="en-US" sz="9600" smtClean="0"/>
+              <a:t>Swept rule domain decomposition for </a:t>
+            </a:r>
+            <a:r>
+              <a:rPr lang="en-US" sz="9600" dirty="0" smtClean="0"/>
               <a:t>1D </a:t>
             </a:r>
             <a:r>

</xml_diff>